<commit_message>
Finished part 1.2 - controllers
</commit_message>
<xml_diff>
--- a/slides/part1_controllers.pptx
+++ b/slides/part1_controllers.pptx
@@ -6,20 +6,27 @@
     <p:sldMasterId id="2147483656" r:id="rId2"/>
   </p:sldMasterIdLst>
   <p:notesMasterIdLst>
-    <p:notesMasterId r:id="rId6"/>
+    <p:notesMasterId r:id="rId13"/>
   </p:notesMasterIdLst>
   <p:handoutMasterIdLst>
-    <p:handoutMasterId r:id="rId7"/>
+    <p:handoutMasterId r:id="rId14"/>
   </p:handoutMasterIdLst>
   <p:sldIdLst>
     <p:sldId id="676" r:id="rId3"/>
     <p:sldId id="677" r:id="rId4"/>
     <p:sldId id="678" r:id="rId5"/>
+    <p:sldId id="679" r:id="rId6"/>
+    <p:sldId id="680" r:id="rId7"/>
+    <p:sldId id="681" r:id="rId8"/>
+    <p:sldId id="682" r:id="rId9"/>
+    <p:sldId id="683" r:id="rId10"/>
+    <p:sldId id="684" r:id="rId11"/>
+    <p:sldId id="685" r:id="rId12"/>
   </p:sldIdLst>
   <p:sldSz cx="9144000" cy="6858000" type="screen4x3"/>
   <p:notesSz cx="9601200" cy="7315200"/>
   <p:custDataLst>
-    <p:tags r:id="rId8"/>
+    <p:tags r:id="rId15"/>
   </p:custDataLst>
   <p:defaultTextStyle>
     <a:defPPr>
@@ -244,7 +251,7 @@
               <a:pPr>
                 <a:defRPr/>
               </a:pPr>
-              <a:t>8/25/2010 9:25 PM</a:t>
+              <a:t>8/25/2010 11:39 PM</a:t>
             </a:fld>
             <a:endParaRPr lang="en-US"/>
           </a:p>
@@ -454,7 +461,7 @@
               <a:pPr>
                 <a:defRPr/>
               </a:pPr>
-              <a:t>8/25/2010 9:25 PM</a:t>
+              <a:t>8/25/2010 11:39 PM</a:t>
             </a:fld>
             <a:endParaRPr lang="en-US"/>
           </a:p>
@@ -854,7 +861,7 @@
             <a:fld id="{645EDAD1-88E4-4536-AD95-0BFD82EC77E6}" type="datetime8">
               <a:rPr lang="en-US" smtClean="0"/>
               <a:pPr/>
-              <a:t>8/25/2010 9:25 PM</a:t>
+              <a:t>8/25/2010 11:39 PM</a:t>
             </a:fld>
             <a:endParaRPr lang="en-US" smtClean="0"/>
           </a:p>
@@ -7055,11 +7062,7 @@
             </a:r>
             <a:r>
               <a:rPr lang="en-US" sz="4600" b="1" smtClean="0"/>
-              <a:t>: </a:t>
-            </a:r>
-            <a:r>
-              <a:rPr lang="en-US" sz="4600" b="1" smtClean="0"/>
-              <a:t>Controllers</a:t>
+              <a:t>: Controllers</a:t>
             </a:r>
             <a:endParaRPr lang="en-US" sz="4600" b="1" dirty="0" smtClean="0">
               <a:solidFill>
@@ -7113,6 +7116,128 @@
               </a:rPr>
               <a:t>javier@lozanotek.com</a:t>
             </a:r>
+          </a:p>
+        </p:txBody>
+      </p:sp>
+    </p:spTree>
+  </p:cSld>
+  <p:clrMapOvr>
+    <a:masterClrMapping/>
+  </p:clrMapOvr>
+  <p:transition>
+    <p:fade/>
+  </p:transition>
+  <p:timing>
+    <p:tnLst>
+      <p:par>
+        <p:cTn id="1" dur="indefinite" restart="never" nodeType="tmRoot"/>
+      </p:par>
+    </p:tnLst>
+  </p:timing>
+</p:sld>
+</file>
+
+<file path=ppt/slides/slide10.xml><?xml version="1.0" encoding="utf-8"?>
+<p:sld xmlns:a="http://schemas.openxmlformats.org/drawingml/2006/main" xmlns:r="http://schemas.openxmlformats.org/officeDocument/2006/relationships" xmlns:p="http://schemas.openxmlformats.org/presentationml/2006/main">
+  <p:cSld>
+    <p:spTree>
+      <p:nvGrpSpPr>
+        <p:cNvPr id="1" name=""/>
+        <p:cNvGrpSpPr/>
+        <p:nvPr/>
+      </p:nvGrpSpPr>
+      <p:grpSpPr>
+        <a:xfrm>
+          <a:off x="0" y="0"/>
+          <a:ext cx="0" cy="0"/>
+          <a:chOff x="0" y="0"/>
+          <a:chExt cx="0" cy="0"/>
+        </a:xfrm>
+      </p:grpSpPr>
+      <p:sp>
+        <p:nvSpPr>
+          <p:cNvPr id="2" name="Title 1"/>
+          <p:cNvSpPr>
+            <a:spLocks noGrp="1"/>
+          </p:cNvSpPr>
+          <p:nvPr>
+            <p:ph type="title"/>
+          </p:nvPr>
+        </p:nvSpPr>
+        <p:spPr/>
+        <p:txBody>
+          <a:bodyPr/>
+          <a:lstStyle/>
+          <a:p>
+            <a:r>
+              <a:rPr lang="en-US" b="1" dirty="0" smtClean="0"/>
+              <a:t>Quick Sample – </a:t>
+            </a:r>
+            <a:r>
+              <a:rPr lang="en-US" b="1" dirty="0" smtClean="0"/>
+              <a:t>Simple Factory</a:t>
+            </a:r>
+            <a:endParaRPr lang="en-US" b="1" dirty="0"/>
+          </a:p>
+        </p:txBody>
+      </p:sp>
+      <p:sp>
+        <p:nvSpPr>
+          <p:cNvPr id="4" name="Slide Number Placeholder 3"/>
+          <p:cNvSpPr>
+            <a:spLocks noGrp="1"/>
+          </p:cNvSpPr>
+          <p:nvPr>
+            <p:ph type="sldNum" sz="quarter" idx="10"/>
+          </p:nvPr>
+        </p:nvSpPr>
+        <p:spPr/>
+        <p:txBody>
+          <a:bodyPr/>
+          <a:lstStyle/>
+          <a:p>
+            <a:pPr>
+              <a:defRPr/>
+            </a:pPr>
+            <a:fld id="{B63753EC-566D-40B0-951D-58F31B9256E5}" type="slidenum">
+              <a:rPr lang="en-US" smtClean="0"/>
+              <a:pPr>
+                <a:defRPr/>
+              </a:pPr>
+              <a:t>10</a:t>
+            </a:fld>
+            <a:endParaRPr lang="en-US"/>
+          </a:p>
+        </p:txBody>
+      </p:sp>
+      <p:sp>
+        <p:nvSpPr>
+          <p:cNvPr id="5" name="Content Placeholder 4"/>
+          <p:cNvSpPr>
+            <a:spLocks noGrp="1"/>
+          </p:cNvSpPr>
+          <p:nvPr>
+            <p:ph idx="1"/>
+          </p:nvPr>
+        </p:nvSpPr>
+        <p:spPr>
+          <a:xfrm>
+            <a:off x="381002" y="2884236"/>
+            <a:ext cx="8410575" cy="1089529"/>
+          </a:xfrm>
+        </p:spPr>
+        <p:txBody>
+          <a:bodyPr anchor="ctr"/>
+          <a:lstStyle/>
+          <a:p>
+            <a:pPr algn="ctr">
+              <a:buNone/>
+            </a:pPr>
+            <a:r>
+              <a:rPr lang="en-US" sz="7200" b="1" dirty="0" smtClean="0"/>
+              <a:t>DEMO</a:t>
+            </a:r>
+            <a:endParaRPr lang="en-US" sz="7200" b="1" dirty="0"/>
           </a:p>
         </p:txBody>
       </p:sp>
@@ -7166,7 +7291,11 @@
           <a:bodyPr/>
           <a:lstStyle/>
           <a:p>
-            <a:endParaRPr lang="en-US"/>
+            <a:r>
+              <a:rPr lang="en-US" b="1" dirty="0" smtClean="0"/>
+              <a:t>Agenda</a:t>
+            </a:r>
+            <a:endParaRPr lang="en-US" b="1" dirty="0"/>
           </a:p>
         </p:txBody>
       </p:sp>
@@ -7180,12 +7309,38 @@
             <p:ph idx="1"/>
           </p:nvPr>
         </p:nvSpPr>
-        <p:spPr/>
+        <p:spPr>
+          <a:xfrm>
+            <a:off x="381002" y="1417638"/>
+            <a:ext cx="8410575" cy="1717393"/>
+          </a:xfrm>
+        </p:spPr>
         <p:txBody>
           <a:bodyPr/>
           <a:lstStyle/>
           <a:p>
-            <a:endParaRPr lang="en-US"/>
+            <a:r>
+              <a:rPr lang="en-US" dirty="0" smtClean="0"/>
+              <a:t>From Route to Controller</a:t>
+            </a:r>
+            <a:endParaRPr lang="en-US" dirty="0" smtClean="0"/>
+          </a:p>
+          <a:p>
+            <a:r>
+              <a:rPr lang="en-US" dirty="0" smtClean="0"/>
+              <a:t>(I)Controller?</a:t>
+            </a:r>
+          </a:p>
+          <a:p>
+            <a:r>
+              <a:rPr lang="en-US" dirty="0" smtClean="0"/>
+              <a:t>Quick Sample: </a:t>
+            </a:r>
+            <a:r>
+              <a:rPr lang="en-US" smtClean="0"/>
+              <a:t>Simple Factory</a:t>
+            </a:r>
+            <a:endParaRPr lang="en-US" dirty="0"/>
           </a:p>
         </p:txBody>
       </p:sp>
@@ -7226,6 +7381,13 @@
   <p:transition>
     <p:fade/>
   </p:transition>
+  <p:timing>
+    <p:tnLst>
+      <p:par>
+        <p:cTn id="1" dur="indefinite" restart="never" nodeType="tmRoot"/>
+      </p:par>
+    </p:tnLst>
+  </p:timing>
 </p:sld>
 </file>
 
@@ -7261,7 +7423,11 @@
           <a:bodyPr/>
           <a:lstStyle/>
           <a:p>
-            <a:endParaRPr lang="en-US"/>
+            <a:r>
+              <a:rPr lang="en-US" b="1" dirty="0" smtClean="0"/>
+              <a:t>From Route To Controller</a:t>
+            </a:r>
+            <a:endParaRPr lang="en-US" b="1" dirty="0"/>
           </a:p>
         </p:txBody>
       </p:sp>
@@ -7275,12 +7441,92 @@
             <p:ph idx="1"/>
           </p:nvPr>
         </p:nvSpPr>
-        <p:spPr/>
+        <p:spPr>
+          <a:xfrm>
+            <a:off x="381002" y="1417638"/>
+            <a:ext cx="8410575" cy="3268587"/>
+          </a:xfrm>
+        </p:spPr>
         <p:txBody>
           <a:bodyPr/>
           <a:lstStyle/>
           <a:p>
-            <a:endParaRPr lang="en-US"/>
+            <a:r>
+              <a:rPr lang="en-US" dirty="0" err="1" smtClean="0"/>
+              <a:t>MvcHandler</a:t>
+            </a:r>
+            <a:r>
+              <a:rPr lang="en-US" dirty="0" smtClean="0"/>
+              <a:t> calls </a:t>
+            </a:r>
+            <a:r>
+              <a:rPr lang="en-US" dirty="0" err="1" smtClean="0"/>
+              <a:t>ControllerBuilder.Current</a:t>
+            </a:r>
+            <a:endParaRPr lang="en-US" dirty="0" smtClean="0"/>
+          </a:p>
+          <a:p>
+            <a:r>
+              <a:rPr lang="en-US" dirty="0" err="1" smtClean="0"/>
+              <a:t>ControllerBuilder</a:t>
+            </a:r>
+            <a:r>
+              <a:rPr lang="en-US" dirty="0" smtClean="0"/>
+              <a:t> Gets </a:t>
+            </a:r>
+            <a:r>
+              <a:rPr lang="en-US" dirty="0" err="1" smtClean="0"/>
+              <a:t>IControllerFactory</a:t>
+            </a:r>
+            <a:endParaRPr lang="en-US" dirty="0" smtClean="0"/>
+          </a:p>
+          <a:p>
+            <a:pPr lvl="1"/>
+            <a:r>
+              <a:rPr lang="en-US" dirty="0" smtClean="0"/>
+              <a:t>It’s </a:t>
+            </a:r>
+            <a:r>
+              <a:rPr lang="en-US" dirty="0" err="1" smtClean="0"/>
+              <a:t>DefaultControllerFactory</a:t>
+            </a:r>
+            <a:r>
+              <a:rPr lang="en-US" dirty="0" smtClean="0"/>
+              <a:t> by default</a:t>
+            </a:r>
+          </a:p>
+          <a:p>
+            <a:r>
+              <a:rPr lang="en-US" dirty="0" smtClean="0"/>
+              <a:t>Handler gets </a:t>
+            </a:r>
+            <a:r>
+              <a:rPr lang="en-US" dirty="0" err="1" smtClean="0"/>
+              <a:t>IController</a:t>
+            </a:r>
+            <a:r>
+              <a:rPr lang="en-US" dirty="0" smtClean="0"/>
+              <a:t> from factory</a:t>
+            </a:r>
+          </a:p>
+          <a:p>
+            <a:pPr lvl="1"/>
+            <a:r>
+              <a:rPr lang="en-US" dirty="0" smtClean="0"/>
+              <a:t>Calls the </a:t>
+            </a:r>
+            <a:r>
+              <a:rPr lang="en-US" dirty="0" err="1" smtClean="0"/>
+              <a:t>CreateController</a:t>
+            </a:r>
+            <a:r>
+              <a:rPr lang="en-US" dirty="0" smtClean="0"/>
+              <a:t>() method</a:t>
+            </a:r>
+          </a:p>
+          <a:p>
+            <a:pPr lvl="1"/>
+            <a:endParaRPr lang="en-US" dirty="0"/>
           </a:p>
         </p:txBody>
       </p:sp>
@@ -7321,6 +7567,1201 @@
   <p:transition>
     <p:fade/>
   </p:transition>
+  <p:timing>
+    <p:tnLst>
+      <p:par>
+        <p:cTn id="1" dur="indefinite" restart="never" nodeType="tmRoot"/>
+      </p:par>
+    </p:tnLst>
+  </p:timing>
+</p:sld>
+</file>
+
+<file path=ppt/slides/slide4.xml><?xml version="1.0" encoding="utf-8"?>
+<p:sld xmlns:a="http://schemas.openxmlformats.org/drawingml/2006/main" xmlns:r="http://schemas.openxmlformats.org/officeDocument/2006/relationships" xmlns:p="http://schemas.openxmlformats.org/presentationml/2006/main">
+  <p:cSld>
+    <p:spTree>
+      <p:nvGrpSpPr>
+        <p:cNvPr id="1" name=""/>
+        <p:cNvGrpSpPr/>
+        <p:nvPr/>
+      </p:nvGrpSpPr>
+      <p:grpSpPr>
+        <a:xfrm>
+          <a:off x="0" y="0"/>
+          <a:ext cx="0" cy="0"/>
+          <a:chOff x="0" y="0"/>
+          <a:chExt cx="0" cy="0"/>
+        </a:xfrm>
+      </p:grpSpPr>
+      <p:sp>
+        <p:nvSpPr>
+          <p:cNvPr id="2" name="Title 1"/>
+          <p:cNvSpPr>
+            <a:spLocks noGrp="1"/>
+          </p:cNvSpPr>
+          <p:nvPr>
+            <p:ph type="title"/>
+          </p:nvPr>
+        </p:nvSpPr>
+        <p:spPr/>
+        <p:txBody>
+          <a:bodyPr/>
+          <a:lstStyle/>
+          <a:p>
+            <a:r>
+              <a:rPr lang="en-US" b="1" dirty="0" smtClean="0"/>
+              <a:t>From Route To Controller</a:t>
+            </a:r>
+            <a:endParaRPr lang="en-US" b="1" dirty="0"/>
+          </a:p>
+        </p:txBody>
+      </p:sp>
+      <p:sp>
+        <p:nvSpPr>
+          <p:cNvPr id="3" name="Content Placeholder 2"/>
+          <p:cNvSpPr>
+            <a:spLocks noGrp="1"/>
+          </p:cNvSpPr>
+          <p:nvPr>
+            <p:ph idx="1"/>
+          </p:nvPr>
+        </p:nvSpPr>
+        <p:spPr>
+          <a:xfrm>
+            <a:off x="381002" y="1417638"/>
+            <a:ext cx="8410575" cy="2677656"/>
+          </a:xfrm>
+        </p:spPr>
+        <p:txBody>
+          <a:bodyPr/>
+          <a:lstStyle/>
+          <a:p>
+            <a:r>
+              <a:rPr lang="en-US" dirty="0" smtClean="0"/>
+              <a:t>Handler executes </a:t>
+            </a:r>
+            <a:r>
+              <a:rPr lang="en-US" dirty="0" err="1" smtClean="0"/>
+              <a:t>IController</a:t>
+            </a:r>
+            <a:endParaRPr lang="en-US" dirty="0" smtClean="0"/>
+          </a:p>
+          <a:p>
+            <a:pPr lvl="1"/>
+            <a:r>
+              <a:rPr lang="en-US" dirty="0" smtClean="0"/>
+              <a:t>Calls Execute() method</a:t>
+            </a:r>
+          </a:p>
+          <a:p>
+            <a:r>
+              <a:rPr lang="en-US" dirty="0" smtClean="0"/>
+              <a:t>Handler disposes of </a:t>
+            </a:r>
+            <a:r>
+              <a:rPr lang="en-US" dirty="0" err="1" smtClean="0"/>
+              <a:t>IController</a:t>
+            </a:r>
+            <a:endParaRPr lang="en-US" dirty="0" smtClean="0"/>
+          </a:p>
+          <a:p>
+            <a:pPr lvl="1"/>
+            <a:r>
+              <a:rPr lang="en-US" dirty="0" smtClean="0"/>
+              <a:t>Tells factory to clean up</a:t>
+            </a:r>
+            <a:endParaRPr lang="en-US" dirty="0" smtClean="0"/>
+          </a:p>
+          <a:p>
+            <a:pPr lvl="1"/>
+            <a:endParaRPr lang="en-US" dirty="0"/>
+          </a:p>
+        </p:txBody>
+      </p:sp>
+      <p:sp>
+        <p:nvSpPr>
+          <p:cNvPr id="4" name="Slide Number Placeholder 3"/>
+          <p:cNvSpPr>
+            <a:spLocks noGrp="1"/>
+          </p:cNvSpPr>
+          <p:nvPr>
+            <p:ph type="sldNum" sz="quarter" idx="10"/>
+          </p:nvPr>
+        </p:nvSpPr>
+        <p:spPr/>
+        <p:txBody>
+          <a:bodyPr/>
+          <a:lstStyle/>
+          <a:p>
+            <a:pPr>
+              <a:defRPr/>
+            </a:pPr>
+            <a:fld id="{B63753EC-566D-40B0-951D-58F31B9256E5}" type="slidenum">
+              <a:rPr lang="en-US" smtClean="0"/>
+              <a:pPr>
+                <a:defRPr/>
+              </a:pPr>
+              <a:t>4</a:t>
+            </a:fld>
+            <a:endParaRPr lang="en-US"/>
+          </a:p>
+        </p:txBody>
+      </p:sp>
+    </p:spTree>
+  </p:cSld>
+  <p:clrMapOvr>
+    <a:masterClrMapping/>
+  </p:clrMapOvr>
+  <p:transition>
+    <p:fade/>
+  </p:transition>
+  <p:timing>
+    <p:tnLst>
+      <p:par>
+        <p:cTn id="1" dur="indefinite" restart="never" nodeType="tmRoot"/>
+      </p:par>
+    </p:tnLst>
+  </p:timing>
+</p:sld>
+</file>
+
+<file path=ppt/slides/slide5.xml><?xml version="1.0" encoding="utf-8"?>
+<p:sld xmlns:a="http://schemas.openxmlformats.org/drawingml/2006/main" xmlns:r="http://schemas.openxmlformats.org/officeDocument/2006/relationships" xmlns:p="http://schemas.openxmlformats.org/presentationml/2006/main">
+  <p:cSld>
+    <p:spTree>
+      <p:nvGrpSpPr>
+        <p:cNvPr id="1" name=""/>
+        <p:cNvGrpSpPr/>
+        <p:nvPr/>
+      </p:nvGrpSpPr>
+      <p:grpSpPr>
+        <a:xfrm>
+          <a:off x="0" y="0"/>
+          <a:ext cx="0" cy="0"/>
+          <a:chOff x="0" y="0"/>
+          <a:chExt cx="0" cy="0"/>
+        </a:xfrm>
+      </p:grpSpPr>
+      <p:sp>
+        <p:nvSpPr>
+          <p:cNvPr id="2" name="Title 1"/>
+          <p:cNvSpPr>
+            <a:spLocks noGrp="1"/>
+          </p:cNvSpPr>
+          <p:nvPr>
+            <p:ph type="title"/>
+          </p:nvPr>
+        </p:nvSpPr>
+        <p:spPr/>
+        <p:txBody>
+          <a:bodyPr/>
+          <a:lstStyle/>
+          <a:p>
+            <a:r>
+              <a:rPr lang="en-US" b="1" dirty="0" smtClean="0"/>
+              <a:t>(I)Controller?</a:t>
+            </a:r>
+            <a:endParaRPr lang="en-US" b="1" dirty="0"/>
+          </a:p>
+        </p:txBody>
+      </p:sp>
+      <p:sp>
+        <p:nvSpPr>
+          <p:cNvPr id="3" name="Content Placeholder 2"/>
+          <p:cNvSpPr>
+            <a:spLocks noGrp="1"/>
+          </p:cNvSpPr>
+          <p:nvPr>
+            <p:ph idx="1"/>
+          </p:nvPr>
+        </p:nvSpPr>
+        <p:spPr>
+          <a:xfrm>
+            <a:off x="381002" y="1417638"/>
+            <a:ext cx="8410575" cy="3342453"/>
+          </a:xfrm>
+        </p:spPr>
+        <p:txBody>
+          <a:bodyPr/>
+          <a:lstStyle/>
+          <a:p>
+            <a:r>
+              <a:rPr lang="en-US" dirty="0" smtClean="0"/>
+              <a:t>(low level) MVC knows only about </a:t>
+            </a:r>
+            <a:r>
+              <a:rPr lang="en-US" dirty="0" err="1" smtClean="0"/>
+              <a:t>IController</a:t>
+            </a:r>
+            <a:endParaRPr lang="en-US" dirty="0" smtClean="0"/>
+          </a:p>
+          <a:p>
+            <a:pPr>
+              <a:buNone/>
+            </a:pPr>
+            <a:endParaRPr lang="en-US" sz="2400" dirty="0" smtClean="0">
+              <a:latin typeface="Consolas" pitchFamily="49" charset="0"/>
+              <a:cs typeface="Consolas" pitchFamily="49" charset="0"/>
+            </a:endParaRPr>
+          </a:p>
+          <a:p>
+            <a:pPr>
+              <a:buNone/>
+            </a:pPr>
+            <a:r>
+              <a:rPr lang="en-US" sz="2400" dirty="0" smtClean="0">
+                <a:latin typeface="Consolas" pitchFamily="49" charset="0"/>
+                <a:cs typeface="Consolas" pitchFamily="49" charset="0"/>
+              </a:rPr>
+              <a:t>public </a:t>
+            </a:r>
+            <a:r>
+              <a:rPr lang="en-US" sz="2400" dirty="0" smtClean="0">
+                <a:latin typeface="Consolas" pitchFamily="49" charset="0"/>
+                <a:cs typeface="Consolas" pitchFamily="49" charset="0"/>
+              </a:rPr>
+              <a:t>interface </a:t>
+            </a:r>
+            <a:r>
+              <a:rPr lang="en-US" sz="2400" dirty="0" err="1" smtClean="0">
+                <a:latin typeface="Consolas" pitchFamily="49" charset="0"/>
+                <a:cs typeface="Consolas" pitchFamily="49" charset="0"/>
+              </a:rPr>
+              <a:t>IController</a:t>
+            </a:r>
+            <a:r>
+              <a:rPr lang="en-US" sz="2400" dirty="0" smtClean="0">
+                <a:latin typeface="Consolas" pitchFamily="49" charset="0"/>
+                <a:cs typeface="Consolas" pitchFamily="49" charset="0"/>
+              </a:rPr>
+              <a:t> { </a:t>
+            </a:r>
+          </a:p>
+          <a:p>
+            <a:pPr>
+              <a:buNone/>
+            </a:pPr>
+            <a:r>
+              <a:rPr lang="en-US" sz="2400" dirty="0" smtClean="0">
+                <a:latin typeface="Consolas" pitchFamily="49" charset="0"/>
+                <a:cs typeface="Consolas" pitchFamily="49" charset="0"/>
+              </a:rPr>
+              <a:t>	void Execute(</a:t>
+            </a:r>
+            <a:r>
+              <a:rPr lang="en-US" sz="2400" dirty="0" err="1" smtClean="0">
+                <a:latin typeface="Consolas" pitchFamily="49" charset="0"/>
+                <a:cs typeface="Consolas" pitchFamily="49" charset="0"/>
+              </a:rPr>
+              <a:t>RequestContext</a:t>
+            </a:r>
+            <a:r>
+              <a:rPr lang="en-US" sz="2400" dirty="0" smtClean="0">
+                <a:latin typeface="Consolas" pitchFamily="49" charset="0"/>
+                <a:cs typeface="Consolas" pitchFamily="49" charset="0"/>
+              </a:rPr>
+              <a:t> </a:t>
+            </a:r>
+            <a:r>
+              <a:rPr lang="en-US" sz="2400" dirty="0" err="1" smtClean="0">
+                <a:latin typeface="Consolas" pitchFamily="49" charset="0"/>
+                <a:cs typeface="Consolas" pitchFamily="49" charset="0"/>
+              </a:rPr>
+              <a:t>requestContext</a:t>
+            </a:r>
+            <a:r>
+              <a:rPr lang="en-US" sz="2400" dirty="0" smtClean="0">
+                <a:latin typeface="Consolas" pitchFamily="49" charset="0"/>
+                <a:cs typeface="Consolas" pitchFamily="49" charset="0"/>
+              </a:rPr>
+              <a:t>); </a:t>
+            </a:r>
+          </a:p>
+          <a:p>
+            <a:pPr>
+              <a:buNone/>
+            </a:pPr>
+            <a:r>
+              <a:rPr lang="en-US" sz="2400" dirty="0" smtClean="0">
+                <a:latin typeface="Consolas" pitchFamily="49" charset="0"/>
+                <a:cs typeface="Consolas" pitchFamily="49" charset="0"/>
+              </a:rPr>
+              <a:t>}</a:t>
+            </a:r>
+          </a:p>
+          <a:p>
+            <a:pPr>
+              <a:buNone/>
+            </a:pPr>
+            <a:endParaRPr lang="en-US" sz="2400" dirty="0" smtClean="0">
+              <a:latin typeface="Consolas" pitchFamily="49" charset="0"/>
+              <a:cs typeface="Consolas" pitchFamily="49" charset="0"/>
+            </a:endParaRPr>
+          </a:p>
+          <a:p>
+            <a:r>
+              <a:rPr lang="en-US" dirty="0" smtClean="0"/>
+              <a:t>It’s nothing more than an abstraction </a:t>
+            </a:r>
+            <a:endParaRPr lang="en-US" dirty="0"/>
+          </a:p>
+        </p:txBody>
+      </p:sp>
+      <p:sp>
+        <p:nvSpPr>
+          <p:cNvPr id="4" name="Slide Number Placeholder 3"/>
+          <p:cNvSpPr>
+            <a:spLocks noGrp="1"/>
+          </p:cNvSpPr>
+          <p:nvPr>
+            <p:ph type="sldNum" sz="quarter" idx="10"/>
+          </p:nvPr>
+        </p:nvSpPr>
+        <p:spPr/>
+        <p:txBody>
+          <a:bodyPr/>
+          <a:lstStyle/>
+          <a:p>
+            <a:pPr>
+              <a:defRPr/>
+            </a:pPr>
+            <a:fld id="{B63753EC-566D-40B0-951D-58F31B9256E5}" type="slidenum">
+              <a:rPr lang="en-US" smtClean="0"/>
+              <a:pPr>
+                <a:defRPr/>
+              </a:pPr>
+              <a:t>5</a:t>
+            </a:fld>
+            <a:endParaRPr lang="en-US"/>
+          </a:p>
+        </p:txBody>
+      </p:sp>
+    </p:spTree>
+  </p:cSld>
+  <p:clrMapOvr>
+    <a:masterClrMapping/>
+  </p:clrMapOvr>
+  <p:transition>
+    <p:fade/>
+  </p:transition>
+  <p:timing>
+    <p:tnLst>
+      <p:par>
+        <p:cTn id="1" dur="indefinite" restart="never" nodeType="tmRoot"/>
+      </p:par>
+    </p:tnLst>
+  </p:timing>
+</p:sld>
+</file>
+
+<file path=ppt/slides/slide6.xml><?xml version="1.0" encoding="utf-8"?>
+<p:sld xmlns:a="http://schemas.openxmlformats.org/drawingml/2006/main" xmlns:r="http://schemas.openxmlformats.org/officeDocument/2006/relationships" xmlns:p="http://schemas.openxmlformats.org/presentationml/2006/main">
+  <p:cSld>
+    <p:spTree>
+      <p:nvGrpSpPr>
+        <p:cNvPr id="1" name=""/>
+        <p:cNvGrpSpPr/>
+        <p:nvPr/>
+      </p:nvGrpSpPr>
+      <p:grpSpPr>
+        <a:xfrm>
+          <a:off x="0" y="0"/>
+          <a:ext cx="0" cy="0"/>
+          <a:chOff x="0" y="0"/>
+          <a:chExt cx="0" cy="0"/>
+        </a:xfrm>
+      </p:grpSpPr>
+      <p:sp>
+        <p:nvSpPr>
+          <p:cNvPr id="2" name="Title 1"/>
+          <p:cNvSpPr>
+            <a:spLocks noGrp="1"/>
+          </p:cNvSpPr>
+          <p:nvPr>
+            <p:ph type="title"/>
+          </p:nvPr>
+        </p:nvSpPr>
+        <p:spPr/>
+        <p:txBody>
+          <a:bodyPr/>
+          <a:lstStyle/>
+          <a:p>
+            <a:r>
+              <a:rPr lang="en-US" b="1" dirty="0" smtClean="0"/>
+              <a:t>(I)Controller?</a:t>
+            </a:r>
+            <a:endParaRPr lang="en-US" b="1" dirty="0"/>
+          </a:p>
+        </p:txBody>
+      </p:sp>
+      <p:sp>
+        <p:nvSpPr>
+          <p:cNvPr id="3" name="Content Placeholder 2"/>
+          <p:cNvSpPr>
+            <a:spLocks noGrp="1"/>
+          </p:cNvSpPr>
+          <p:nvPr>
+            <p:ph idx="1"/>
+          </p:nvPr>
+        </p:nvSpPr>
+        <p:spPr>
+          <a:xfrm>
+            <a:off x="381002" y="1417638"/>
+            <a:ext cx="8410575" cy="2603790"/>
+          </a:xfrm>
+        </p:spPr>
+        <p:txBody>
+          <a:bodyPr/>
+          <a:lstStyle/>
+          <a:p>
+            <a:r>
+              <a:rPr lang="en-US" dirty="0" smtClean="0"/>
+              <a:t>However, most of MVC knows about </a:t>
+            </a:r>
+          </a:p>
+          <a:p>
+            <a:pPr lvl="1"/>
+            <a:r>
+              <a:rPr lang="en-US" dirty="0" err="1" smtClean="0"/>
+              <a:t>ControllerBase</a:t>
+            </a:r>
+            <a:r>
+              <a:rPr lang="en-US" dirty="0" smtClean="0"/>
+              <a:t> (implements </a:t>
+            </a:r>
+            <a:r>
+              <a:rPr lang="en-US" dirty="0" err="1" smtClean="0"/>
+              <a:t>IController</a:t>
+            </a:r>
+            <a:r>
+              <a:rPr lang="en-US" dirty="0" smtClean="0"/>
+              <a:t>)</a:t>
+            </a:r>
+          </a:p>
+          <a:p>
+            <a:pPr lvl="1"/>
+            <a:r>
+              <a:rPr lang="en-US" dirty="0" smtClean="0"/>
+              <a:t>Controller (inherits from </a:t>
+            </a:r>
+            <a:r>
+              <a:rPr lang="en-US" dirty="0" err="1" smtClean="0"/>
+              <a:t>ControllerBase</a:t>
+            </a:r>
+            <a:r>
+              <a:rPr lang="en-US" dirty="0" smtClean="0"/>
+              <a:t>)</a:t>
+            </a:r>
+          </a:p>
+          <a:p>
+            <a:pPr>
+              <a:buNone/>
+            </a:pPr>
+            <a:endParaRPr lang="en-US" sz="2400" dirty="0" smtClean="0">
+              <a:latin typeface="Consolas" pitchFamily="49" charset="0"/>
+              <a:cs typeface="Consolas" pitchFamily="49" charset="0"/>
+            </a:endParaRPr>
+          </a:p>
+          <a:p>
+            <a:r>
+              <a:rPr lang="en-US" dirty="0" smtClean="0"/>
+              <a:t>Why so many?</a:t>
+            </a:r>
+            <a:endParaRPr lang="en-US" dirty="0"/>
+          </a:p>
+        </p:txBody>
+      </p:sp>
+      <p:sp>
+        <p:nvSpPr>
+          <p:cNvPr id="4" name="Slide Number Placeholder 3"/>
+          <p:cNvSpPr>
+            <a:spLocks noGrp="1"/>
+          </p:cNvSpPr>
+          <p:nvPr>
+            <p:ph type="sldNum" sz="quarter" idx="10"/>
+          </p:nvPr>
+        </p:nvSpPr>
+        <p:spPr/>
+        <p:txBody>
+          <a:bodyPr/>
+          <a:lstStyle/>
+          <a:p>
+            <a:pPr>
+              <a:defRPr/>
+            </a:pPr>
+            <a:fld id="{B63753EC-566D-40B0-951D-58F31B9256E5}" type="slidenum">
+              <a:rPr lang="en-US" smtClean="0"/>
+              <a:pPr>
+                <a:defRPr/>
+              </a:pPr>
+              <a:t>6</a:t>
+            </a:fld>
+            <a:endParaRPr lang="en-US"/>
+          </a:p>
+        </p:txBody>
+      </p:sp>
+    </p:spTree>
+  </p:cSld>
+  <p:clrMapOvr>
+    <a:masterClrMapping/>
+  </p:clrMapOvr>
+  <p:transition>
+    <p:fade/>
+  </p:transition>
+  <p:timing>
+    <p:tnLst>
+      <p:par>
+        <p:cTn id="1" dur="indefinite" restart="never" nodeType="tmRoot"/>
+      </p:par>
+    </p:tnLst>
+  </p:timing>
+</p:sld>
+</file>
+
+<file path=ppt/slides/slide7.xml><?xml version="1.0" encoding="utf-8"?>
+<p:sld xmlns:a="http://schemas.openxmlformats.org/drawingml/2006/main" xmlns:r="http://schemas.openxmlformats.org/officeDocument/2006/relationships" xmlns:p="http://schemas.openxmlformats.org/presentationml/2006/main">
+  <p:cSld>
+    <p:spTree>
+      <p:nvGrpSpPr>
+        <p:cNvPr id="1" name=""/>
+        <p:cNvGrpSpPr/>
+        <p:nvPr/>
+      </p:nvGrpSpPr>
+      <p:grpSpPr>
+        <a:xfrm>
+          <a:off x="0" y="0"/>
+          <a:ext cx="0" cy="0"/>
+          <a:chOff x="0" y="0"/>
+          <a:chExt cx="0" cy="0"/>
+        </a:xfrm>
+      </p:grpSpPr>
+      <p:sp>
+        <p:nvSpPr>
+          <p:cNvPr id="2" name="Title 1"/>
+          <p:cNvSpPr>
+            <a:spLocks noGrp="1"/>
+          </p:cNvSpPr>
+          <p:nvPr>
+            <p:ph type="title"/>
+          </p:nvPr>
+        </p:nvSpPr>
+        <p:spPr/>
+        <p:txBody>
+          <a:bodyPr/>
+          <a:lstStyle/>
+          <a:p>
+            <a:r>
+              <a:rPr lang="en-US" b="1" dirty="0" smtClean="0"/>
+              <a:t>(I)Controller?</a:t>
+            </a:r>
+            <a:endParaRPr lang="en-US" b="1" dirty="0"/>
+          </a:p>
+        </p:txBody>
+      </p:sp>
+      <p:sp>
+        <p:nvSpPr>
+          <p:cNvPr id="3" name="Content Placeholder 2"/>
+          <p:cNvSpPr>
+            <a:spLocks noGrp="1"/>
+          </p:cNvSpPr>
+          <p:nvPr>
+            <p:ph idx="1"/>
+          </p:nvPr>
+        </p:nvSpPr>
+        <p:spPr>
+          <a:xfrm>
+            <a:off x="381002" y="1417638"/>
+            <a:ext cx="8410575" cy="3046988"/>
+          </a:xfrm>
+        </p:spPr>
+        <p:txBody>
+          <a:bodyPr/>
+          <a:lstStyle/>
+          <a:p>
+            <a:r>
+              <a:rPr lang="en-US" dirty="0" err="1" smtClean="0"/>
+              <a:t>ControllerBase</a:t>
+            </a:r>
+            <a:r>
+              <a:rPr lang="en-US" dirty="0" smtClean="0"/>
+              <a:t> sets up basic functionality</a:t>
+            </a:r>
+          </a:p>
+          <a:p>
+            <a:pPr lvl="1"/>
+            <a:r>
+              <a:rPr lang="en-US" dirty="0" err="1" smtClean="0"/>
+              <a:t>ControllerContext</a:t>
+            </a:r>
+            <a:endParaRPr lang="en-US" dirty="0" smtClean="0"/>
+          </a:p>
+          <a:p>
+            <a:pPr lvl="1"/>
+            <a:r>
+              <a:rPr lang="en-US" dirty="0" err="1" smtClean="0"/>
+              <a:t>ViewData</a:t>
+            </a:r>
+            <a:endParaRPr lang="en-US" dirty="0" smtClean="0"/>
+          </a:p>
+          <a:p>
+            <a:pPr lvl="1"/>
+            <a:r>
+              <a:rPr lang="en-US" dirty="0" err="1" smtClean="0"/>
+              <a:t>ValueProvider</a:t>
+            </a:r>
+            <a:endParaRPr lang="en-US" dirty="0" smtClean="0"/>
+          </a:p>
+          <a:p>
+            <a:pPr lvl="1"/>
+            <a:r>
+              <a:rPr lang="en-US" dirty="0" err="1" smtClean="0"/>
+              <a:t>TempData</a:t>
+            </a:r>
+            <a:endParaRPr lang="en-US" dirty="0"/>
+          </a:p>
+          <a:p>
+            <a:pPr lvl="1"/>
+            <a:endParaRPr lang="en-US" sz="2400" dirty="0" smtClean="0">
+              <a:latin typeface="Consolas" pitchFamily="49" charset="0"/>
+              <a:cs typeface="Consolas" pitchFamily="49" charset="0"/>
+            </a:endParaRPr>
+          </a:p>
+        </p:txBody>
+      </p:sp>
+      <p:sp>
+        <p:nvSpPr>
+          <p:cNvPr id="4" name="Slide Number Placeholder 3"/>
+          <p:cNvSpPr>
+            <a:spLocks noGrp="1"/>
+          </p:cNvSpPr>
+          <p:nvPr>
+            <p:ph type="sldNum" sz="quarter" idx="10"/>
+          </p:nvPr>
+        </p:nvSpPr>
+        <p:spPr/>
+        <p:txBody>
+          <a:bodyPr/>
+          <a:lstStyle/>
+          <a:p>
+            <a:pPr>
+              <a:defRPr/>
+            </a:pPr>
+            <a:fld id="{B63753EC-566D-40B0-951D-58F31B9256E5}" type="slidenum">
+              <a:rPr lang="en-US" smtClean="0"/>
+              <a:pPr>
+                <a:defRPr/>
+              </a:pPr>
+              <a:t>7</a:t>
+            </a:fld>
+            <a:endParaRPr lang="en-US"/>
+          </a:p>
+        </p:txBody>
+      </p:sp>
+    </p:spTree>
+  </p:cSld>
+  <p:clrMapOvr>
+    <a:masterClrMapping/>
+  </p:clrMapOvr>
+  <p:transition>
+    <p:fade/>
+  </p:transition>
+  <p:timing>
+    <p:tnLst>
+      <p:par>
+        <p:cTn id="1" dur="indefinite" restart="never" nodeType="tmRoot"/>
+      </p:par>
+    </p:tnLst>
+  </p:timing>
+</p:sld>
+</file>
+
+<file path=ppt/slides/slide8.xml><?xml version="1.0" encoding="utf-8"?>
+<p:sld xmlns:a="http://schemas.openxmlformats.org/drawingml/2006/main" xmlns:r="http://schemas.openxmlformats.org/officeDocument/2006/relationships" xmlns:p="http://schemas.openxmlformats.org/presentationml/2006/main">
+  <p:cSld>
+    <p:spTree>
+      <p:nvGrpSpPr>
+        <p:cNvPr id="1" name=""/>
+        <p:cNvGrpSpPr/>
+        <p:nvPr/>
+      </p:nvGrpSpPr>
+      <p:grpSpPr>
+        <a:xfrm>
+          <a:off x="0" y="0"/>
+          <a:ext cx="0" cy="0"/>
+          <a:chOff x="0" y="0"/>
+          <a:chExt cx="0" cy="0"/>
+        </a:xfrm>
+      </p:grpSpPr>
+      <p:sp>
+        <p:nvSpPr>
+          <p:cNvPr id="2" name="Title 1"/>
+          <p:cNvSpPr>
+            <a:spLocks noGrp="1"/>
+          </p:cNvSpPr>
+          <p:nvPr>
+            <p:ph type="title"/>
+          </p:nvPr>
+        </p:nvSpPr>
+        <p:spPr/>
+        <p:txBody>
+          <a:bodyPr/>
+          <a:lstStyle/>
+          <a:p>
+            <a:r>
+              <a:rPr lang="en-US" b="1" dirty="0" smtClean="0"/>
+              <a:t>(I)Controller?</a:t>
+            </a:r>
+            <a:endParaRPr lang="en-US" b="1" dirty="0"/>
+          </a:p>
+        </p:txBody>
+      </p:sp>
+      <p:sp>
+        <p:nvSpPr>
+          <p:cNvPr id="3" name="Content Placeholder 2"/>
+          <p:cNvSpPr>
+            <a:spLocks noGrp="1"/>
+          </p:cNvSpPr>
+          <p:nvPr>
+            <p:ph idx="1"/>
+          </p:nvPr>
+        </p:nvSpPr>
+        <p:spPr>
+          <a:xfrm>
+            <a:off x="381002" y="1417638"/>
+            <a:ext cx="8410575" cy="4819781"/>
+          </a:xfrm>
+        </p:spPr>
+        <p:txBody>
+          <a:bodyPr/>
+          <a:lstStyle/>
+          <a:p>
+            <a:r>
+              <a:rPr lang="en-US" dirty="0" smtClean="0"/>
+              <a:t>Controller adds the special sauce</a:t>
+            </a:r>
+          </a:p>
+          <a:p>
+            <a:pPr lvl="1"/>
+            <a:r>
+              <a:rPr lang="en-US" dirty="0" smtClean="0"/>
+              <a:t>Filter implementation</a:t>
+            </a:r>
+          </a:p>
+          <a:p>
+            <a:pPr lvl="2"/>
+            <a:r>
+              <a:rPr lang="en-US" dirty="0" err="1" smtClean="0"/>
+              <a:t>On</a:t>
+            </a:r>
+            <a:r>
+              <a:rPr lang="en-US" i="1" dirty="0" err="1" smtClean="0"/>
+              <a:t>Event</a:t>
+            </a:r>
+            <a:r>
+              <a:rPr lang="en-US" dirty="0" smtClean="0"/>
+              <a:t>() …</a:t>
+            </a:r>
+          </a:p>
+          <a:p>
+            <a:pPr lvl="1"/>
+            <a:r>
+              <a:rPr lang="en-US" dirty="0" smtClean="0"/>
+              <a:t>Plethora of </a:t>
+            </a:r>
+            <a:r>
+              <a:rPr lang="en-US" dirty="0" err="1" smtClean="0"/>
+              <a:t>ActionResult</a:t>
+            </a:r>
+            <a:r>
+              <a:rPr lang="en-US" dirty="0" smtClean="0"/>
+              <a:t> methods</a:t>
+            </a:r>
+          </a:p>
+          <a:p>
+            <a:pPr lvl="2"/>
+            <a:r>
+              <a:rPr lang="en-US" dirty="0" smtClean="0"/>
+              <a:t>View()</a:t>
+            </a:r>
+          </a:p>
+          <a:p>
+            <a:pPr lvl="2"/>
+            <a:r>
+              <a:rPr lang="en-US" dirty="0" smtClean="0"/>
+              <a:t>File()</a:t>
+            </a:r>
+          </a:p>
+          <a:p>
+            <a:pPr lvl="2"/>
+            <a:r>
+              <a:rPr lang="en-US" dirty="0" err="1" smtClean="0"/>
+              <a:t>Json</a:t>
+            </a:r>
+            <a:r>
+              <a:rPr lang="en-US" dirty="0" smtClean="0"/>
+              <a:t>()</a:t>
+            </a:r>
+          </a:p>
+          <a:p>
+            <a:pPr lvl="1"/>
+            <a:r>
+              <a:rPr lang="en-US" dirty="0" smtClean="0"/>
+              <a:t>Security (</a:t>
+            </a:r>
+            <a:r>
+              <a:rPr lang="en-US" dirty="0" err="1" smtClean="0"/>
+              <a:t>IPrincipal</a:t>
+            </a:r>
+            <a:r>
+              <a:rPr lang="en-US" dirty="0" smtClean="0"/>
+              <a:t>)</a:t>
+            </a:r>
+          </a:p>
+          <a:p>
+            <a:pPr lvl="1"/>
+            <a:r>
+              <a:rPr lang="en-US" dirty="0" err="1" smtClean="0"/>
+              <a:t>ActionInvoker</a:t>
+            </a:r>
+            <a:endParaRPr lang="en-US" dirty="0"/>
+          </a:p>
+          <a:p>
+            <a:pPr lvl="1"/>
+            <a:endParaRPr lang="en-US" sz="2400" dirty="0" smtClean="0">
+              <a:latin typeface="Consolas" pitchFamily="49" charset="0"/>
+              <a:cs typeface="Consolas" pitchFamily="49" charset="0"/>
+            </a:endParaRPr>
+          </a:p>
+        </p:txBody>
+      </p:sp>
+      <p:sp>
+        <p:nvSpPr>
+          <p:cNvPr id="4" name="Slide Number Placeholder 3"/>
+          <p:cNvSpPr>
+            <a:spLocks noGrp="1"/>
+          </p:cNvSpPr>
+          <p:nvPr>
+            <p:ph type="sldNum" sz="quarter" idx="10"/>
+          </p:nvPr>
+        </p:nvSpPr>
+        <p:spPr/>
+        <p:txBody>
+          <a:bodyPr/>
+          <a:lstStyle/>
+          <a:p>
+            <a:pPr>
+              <a:defRPr/>
+            </a:pPr>
+            <a:fld id="{B63753EC-566D-40B0-951D-58F31B9256E5}" type="slidenum">
+              <a:rPr lang="en-US" smtClean="0"/>
+              <a:pPr>
+                <a:defRPr/>
+              </a:pPr>
+              <a:t>8</a:t>
+            </a:fld>
+            <a:endParaRPr lang="en-US"/>
+          </a:p>
+        </p:txBody>
+      </p:sp>
+    </p:spTree>
+  </p:cSld>
+  <p:clrMapOvr>
+    <a:masterClrMapping/>
+  </p:clrMapOvr>
+  <p:transition>
+    <p:fade/>
+  </p:transition>
+  <p:timing>
+    <p:tnLst>
+      <p:par>
+        <p:cTn id="1" dur="indefinite" restart="never" nodeType="tmRoot"/>
+      </p:par>
+    </p:tnLst>
+  </p:timing>
+</p:sld>
+</file>
+
+<file path=ppt/slides/slide9.xml><?xml version="1.0" encoding="utf-8"?>
+<p:sld xmlns:a="http://schemas.openxmlformats.org/drawingml/2006/main" xmlns:r="http://schemas.openxmlformats.org/officeDocument/2006/relationships" xmlns:p="http://schemas.openxmlformats.org/presentationml/2006/main">
+  <p:cSld>
+    <p:spTree>
+      <p:nvGrpSpPr>
+        <p:cNvPr id="1" name=""/>
+        <p:cNvGrpSpPr/>
+        <p:nvPr/>
+      </p:nvGrpSpPr>
+      <p:grpSpPr>
+        <a:xfrm>
+          <a:off x="0" y="0"/>
+          <a:ext cx="0" cy="0"/>
+          <a:chOff x="0" y="0"/>
+          <a:chExt cx="0" cy="0"/>
+        </a:xfrm>
+      </p:grpSpPr>
+      <p:sp>
+        <p:nvSpPr>
+          <p:cNvPr id="2" name="Title 1"/>
+          <p:cNvSpPr>
+            <a:spLocks noGrp="1"/>
+          </p:cNvSpPr>
+          <p:nvPr>
+            <p:ph type="title"/>
+          </p:nvPr>
+        </p:nvSpPr>
+        <p:spPr/>
+        <p:txBody>
+          <a:bodyPr/>
+          <a:lstStyle/>
+          <a:p>
+            <a:r>
+              <a:rPr lang="en-US" b="1" dirty="0" smtClean="0"/>
+              <a:t>(I)Controller?</a:t>
+            </a:r>
+            <a:endParaRPr lang="en-US" b="1" dirty="0"/>
+          </a:p>
+        </p:txBody>
+      </p:sp>
+      <p:sp>
+        <p:nvSpPr>
+          <p:cNvPr id="3" name="Content Placeholder 2"/>
+          <p:cNvSpPr>
+            <a:spLocks noGrp="1"/>
+          </p:cNvSpPr>
+          <p:nvPr>
+            <p:ph idx="1"/>
+          </p:nvPr>
+        </p:nvSpPr>
+        <p:spPr>
+          <a:xfrm>
+            <a:off x="381002" y="1417638"/>
+            <a:ext cx="8410575" cy="6481774"/>
+          </a:xfrm>
+        </p:spPr>
+        <p:txBody>
+          <a:bodyPr/>
+          <a:lstStyle/>
+          <a:p>
+            <a:r>
+              <a:rPr lang="en-US" dirty="0" smtClean="0"/>
+              <a:t>A Controller is also a</a:t>
+            </a:r>
+          </a:p>
+          <a:p>
+            <a:pPr lvl="1"/>
+            <a:r>
+              <a:rPr lang="en-US" dirty="0" err="1" smtClean="0"/>
+              <a:t>IActionFilter</a:t>
+            </a:r>
+            <a:endParaRPr lang="en-US" dirty="0" smtClean="0"/>
+          </a:p>
+          <a:p>
+            <a:pPr lvl="1"/>
+            <a:r>
+              <a:rPr lang="en-US" dirty="0" err="1" smtClean="0"/>
+              <a:t>IExceptionFilter</a:t>
+            </a:r>
+            <a:endParaRPr lang="en-US" dirty="0" smtClean="0"/>
+          </a:p>
+          <a:p>
+            <a:pPr lvl="1"/>
+            <a:r>
+              <a:rPr lang="en-US" dirty="0" err="1" smtClean="0"/>
+              <a:t>IResultFilter</a:t>
+            </a:r>
+            <a:endParaRPr lang="en-US" dirty="0" smtClean="0"/>
+          </a:p>
+          <a:p>
+            <a:pPr lvl="1"/>
+            <a:r>
+              <a:rPr lang="en-US" dirty="0" err="1" smtClean="0"/>
+              <a:t>IAuthorizationFilter</a:t>
+            </a:r>
+            <a:endParaRPr lang="en-US" dirty="0" smtClean="0"/>
+          </a:p>
+          <a:p>
+            <a:pPr lvl="1"/>
+            <a:endParaRPr lang="en-US" dirty="0" smtClean="0"/>
+          </a:p>
+          <a:p>
+            <a:pPr lvl="1">
+              <a:buNone/>
+            </a:pPr>
+            <a:r>
+              <a:rPr lang="en-US" sz="2400" dirty="0" smtClean="0">
+                <a:latin typeface="Consolas" pitchFamily="49" charset="0"/>
+                <a:cs typeface="Consolas" pitchFamily="49" charset="0"/>
+              </a:rPr>
+              <a:t>public abstract class Controller : </a:t>
+            </a:r>
+            <a:r>
+              <a:rPr lang="en-US" sz="2400" b="1" dirty="0" err="1" smtClean="0">
+                <a:latin typeface="Consolas" pitchFamily="49" charset="0"/>
+                <a:cs typeface="Consolas" pitchFamily="49" charset="0"/>
+              </a:rPr>
+              <a:t>ControllerBase</a:t>
+            </a:r>
+            <a:r>
+              <a:rPr lang="en-US" sz="2400" dirty="0" smtClean="0">
+                <a:latin typeface="Consolas" pitchFamily="49" charset="0"/>
+                <a:cs typeface="Consolas" pitchFamily="49" charset="0"/>
+              </a:rPr>
+              <a:t>, </a:t>
+            </a:r>
+            <a:r>
+              <a:rPr lang="en-US" sz="2400" b="1" dirty="0" err="1" smtClean="0">
+                <a:latin typeface="Consolas" pitchFamily="49" charset="0"/>
+                <a:cs typeface="Consolas" pitchFamily="49" charset="0"/>
+              </a:rPr>
+              <a:t>IActionFilter</a:t>
+            </a:r>
+            <a:r>
+              <a:rPr lang="en-US" sz="2400" dirty="0" smtClean="0">
+                <a:latin typeface="Consolas" pitchFamily="49" charset="0"/>
+                <a:cs typeface="Consolas" pitchFamily="49" charset="0"/>
+              </a:rPr>
+              <a:t>, </a:t>
+            </a:r>
+            <a:r>
+              <a:rPr lang="en-US" sz="2400" b="1" dirty="0" err="1" smtClean="0">
+                <a:latin typeface="Consolas" pitchFamily="49" charset="0"/>
+                <a:cs typeface="Consolas" pitchFamily="49" charset="0"/>
+              </a:rPr>
+              <a:t>IAuthorizationFilter</a:t>
+            </a:r>
+            <a:r>
+              <a:rPr lang="en-US" sz="2400" dirty="0" smtClean="0">
+                <a:latin typeface="Consolas" pitchFamily="49" charset="0"/>
+                <a:cs typeface="Consolas" pitchFamily="49" charset="0"/>
+              </a:rPr>
+              <a:t>, </a:t>
+            </a:r>
+            <a:r>
+              <a:rPr lang="en-US" sz="2400" dirty="0" err="1" smtClean="0">
+                <a:latin typeface="Consolas" pitchFamily="49" charset="0"/>
+                <a:cs typeface="Consolas" pitchFamily="49" charset="0"/>
+              </a:rPr>
+              <a:t>IDisposable</a:t>
+            </a:r>
+            <a:r>
+              <a:rPr lang="en-US" sz="2400" dirty="0" smtClean="0">
+                <a:latin typeface="Consolas" pitchFamily="49" charset="0"/>
+                <a:cs typeface="Consolas" pitchFamily="49" charset="0"/>
+              </a:rPr>
+              <a:t>, </a:t>
+            </a:r>
+            <a:r>
+              <a:rPr lang="en-US" sz="2400" b="1" dirty="0" err="1" smtClean="0">
+                <a:latin typeface="Consolas" pitchFamily="49" charset="0"/>
+                <a:cs typeface="Consolas" pitchFamily="49" charset="0"/>
+              </a:rPr>
+              <a:t>IExceptionFilter</a:t>
+            </a:r>
+            <a:r>
+              <a:rPr lang="en-US" sz="2400" dirty="0" smtClean="0">
+                <a:latin typeface="Consolas" pitchFamily="49" charset="0"/>
+                <a:cs typeface="Consolas" pitchFamily="49" charset="0"/>
+              </a:rPr>
+              <a:t>, </a:t>
+            </a:r>
+            <a:r>
+              <a:rPr lang="en-US" sz="2400" b="1" dirty="0" err="1" smtClean="0">
+                <a:latin typeface="Consolas" pitchFamily="49" charset="0"/>
+                <a:cs typeface="Consolas" pitchFamily="49" charset="0"/>
+              </a:rPr>
+              <a:t>IResultFilter</a:t>
+            </a:r>
+            <a:r>
+              <a:rPr lang="en-US" sz="2400" dirty="0" smtClean="0">
+                <a:latin typeface="Consolas" pitchFamily="49" charset="0"/>
+                <a:cs typeface="Consolas" pitchFamily="49" charset="0"/>
+              </a:rPr>
+              <a:t> {</a:t>
+            </a:r>
+          </a:p>
+          <a:p>
+            <a:pPr lvl="1">
+              <a:buNone/>
+            </a:pPr>
+            <a:r>
+              <a:rPr lang="en-US" sz="2400" dirty="0" smtClean="0">
+                <a:latin typeface="Consolas" pitchFamily="49" charset="0"/>
+                <a:cs typeface="Consolas" pitchFamily="49" charset="0"/>
+              </a:rPr>
+              <a:t>}</a:t>
+            </a:r>
+            <a:endParaRPr lang="en-US" sz="2400" dirty="0" smtClean="0">
+              <a:latin typeface="Consolas" pitchFamily="49" charset="0"/>
+              <a:cs typeface="Consolas" pitchFamily="49" charset="0"/>
+            </a:endParaRPr>
+          </a:p>
+          <a:p>
+            <a:pPr lvl="1">
+              <a:buNone/>
+            </a:pPr>
+            <a:r>
+              <a:rPr lang="en-US" dirty="0" smtClean="0"/>
+              <a:t> </a:t>
+            </a:r>
+            <a:endParaRPr lang="en-US" dirty="0" smtClean="0"/>
+          </a:p>
+          <a:p>
+            <a:pPr lvl="1"/>
+            <a:endParaRPr lang="en-US" dirty="0"/>
+          </a:p>
+          <a:p>
+            <a:pPr lvl="1"/>
+            <a:endParaRPr lang="en-US" sz="2400" dirty="0" smtClean="0">
+              <a:latin typeface="Consolas" pitchFamily="49" charset="0"/>
+              <a:cs typeface="Consolas" pitchFamily="49" charset="0"/>
+            </a:endParaRPr>
+          </a:p>
+        </p:txBody>
+      </p:sp>
+      <p:sp>
+        <p:nvSpPr>
+          <p:cNvPr id="4" name="Slide Number Placeholder 3"/>
+          <p:cNvSpPr>
+            <a:spLocks noGrp="1"/>
+          </p:cNvSpPr>
+          <p:nvPr>
+            <p:ph type="sldNum" sz="quarter" idx="10"/>
+          </p:nvPr>
+        </p:nvSpPr>
+        <p:spPr/>
+        <p:txBody>
+          <a:bodyPr/>
+          <a:lstStyle/>
+          <a:p>
+            <a:pPr>
+              <a:defRPr/>
+            </a:pPr>
+            <a:fld id="{B63753EC-566D-40B0-951D-58F31B9256E5}" type="slidenum">
+              <a:rPr lang="en-US" smtClean="0"/>
+              <a:pPr>
+                <a:defRPr/>
+              </a:pPr>
+              <a:t>9</a:t>
+            </a:fld>
+            <a:endParaRPr lang="en-US"/>
+          </a:p>
+        </p:txBody>
+      </p:sp>
+    </p:spTree>
+  </p:cSld>
+  <p:clrMapOvr>
+    <a:masterClrMapping/>
+  </p:clrMapOvr>
+  <p:transition>
+    <p:fade/>
+  </p:transition>
+  <p:timing>
+    <p:tnLst>
+      <p:par>
+        <p:cTn id="1" dur="indefinite" restart="never" nodeType="tmRoot"/>
+      </p:par>
+    </p:tnLst>
+  </p:timing>
 </p:sld>
 </file>
 

</xml_diff>